<commit_message>
Add more visualizations to powerpoint
</commit_message>
<xml_diff>
--- a/Visualizations.pptx
+++ b/Visualizations.pptx
@@ -5,16 +5,22 @@
     <p:sldMasterId id="2147483672" r:id="rId1"/>
   </p:sldMasterIdLst>
   <p:notesMasterIdLst>
-    <p:notesMasterId r:id="rId9"/>
+    <p:notesMasterId r:id="rId15"/>
   </p:notesMasterIdLst>
   <p:sldIdLst>
     <p:sldId id="256" r:id="rId2"/>
     <p:sldId id="257" r:id="rId3"/>
     <p:sldId id="258" r:id="rId4"/>
-    <p:sldId id="263" r:id="rId5"/>
-    <p:sldId id="262" r:id="rId6"/>
-    <p:sldId id="264" r:id="rId7"/>
-    <p:sldId id="265" r:id="rId8"/>
+    <p:sldId id="266" r:id="rId5"/>
+    <p:sldId id="267" r:id="rId6"/>
+    <p:sldId id="265" r:id="rId7"/>
+    <p:sldId id="268" r:id="rId8"/>
+    <p:sldId id="269" r:id="rId9"/>
+    <p:sldId id="272" r:id="rId10"/>
+    <p:sldId id="270" r:id="rId11"/>
+    <p:sldId id="273" r:id="rId12"/>
+    <p:sldId id="274" r:id="rId13"/>
+    <p:sldId id="275" r:id="rId14"/>
   </p:sldIdLst>
   <p:sldSz cx="12192000" cy="6858000"/>
   <p:notesSz cx="6858000" cy="9144000"/>
@@ -203,7 +209,7 @@
           <a:p>
             <a:fld id="{E5D1FE24-7D53-9748-A252-90A025C0379A}" type="datetimeFigureOut">
               <a:rPr lang="en-US" smtClean="0"/>
-              <a:t>4/18/22</a:t>
+              <a:t>4/25/22</a:t>
             </a:fld>
             <a:endParaRPr lang="en-US"/>
           </a:p>
@@ -533,11 +539,8 @@
             </a:pPr>
             <a:r>
               <a:rPr lang="en-US" dirty="0"/>
-              <a:t>- Re did this plot on daily mean value – group boxplots by year (not flat lines anymore)</a:t>
-            </a:r>
-          </a:p>
-          <a:p>
-            <a:endParaRPr lang="en-US" dirty="0"/>
+              <a:t>- Changed to water year</a:t>
+            </a:r>
           </a:p>
         </p:txBody>
       </p:sp>
@@ -567,7 +570,589 @@
     </p:spTree>
     <p:extLst>
       <p:ext uri="{BB962C8B-B14F-4D97-AF65-F5344CB8AC3E}">
-        <p14:creationId xmlns:p14="http://schemas.microsoft.com/office/powerpoint/2010/main" val="1270298057"/>
+        <p14:creationId xmlns:p14="http://schemas.microsoft.com/office/powerpoint/2010/main" val="3573766430"/>
+      </p:ext>
+    </p:extLst>
+  </p:cSld>
+  <p:clrMapOvr>
+    <a:masterClrMapping/>
+  </p:clrMapOvr>
+</p:notes>
+</file>
+
+<file path=ppt/notesSlides/notesSlide2.xml><?xml version="1.0" encoding="utf-8"?>
+<p:notes xmlns:a="http://schemas.openxmlformats.org/drawingml/2006/main" xmlns:r="http://schemas.openxmlformats.org/officeDocument/2006/relationships" xmlns:p="http://schemas.openxmlformats.org/presentationml/2006/main">
+  <p:cSld>
+    <p:spTree>
+      <p:nvGrpSpPr>
+        <p:cNvPr id="1" name=""/>
+        <p:cNvGrpSpPr/>
+        <p:nvPr/>
+      </p:nvGrpSpPr>
+      <p:grpSpPr>
+        <a:xfrm>
+          <a:off x="0" y="0"/>
+          <a:ext cx="0" cy="0"/>
+          <a:chOff x="0" y="0"/>
+          <a:chExt cx="0" cy="0"/>
+        </a:xfrm>
+      </p:grpSpPr>
+      <p:sp>
+        <p:nvSpPr>
+          <p:cNvPr id="2" name="Slide Image Placeholder 1"/>
+          <p:cNvSpPr>
+            <a:spLocks noGrp="1" noRot="1" noChangeAspect="1"/>
+          </p:cNvSpPr>
+          <p:nvPr>
+            <p:ph type="sldImg"/>
+          </p:nvPr>
+        </p:nvSpPr>
+        <p:spPr/>
+      </p:sp>
+      <p:sp>
+        <p:nvSpPr>
+          <p:cNvPr id="3" name="Notes Placeholder 2"/>
+          <p:cNvSpPr>
+            <a:spLocks noGrp="1"/>
+          </p:cNvSpPr>
+          <p:nvPr>
+            <p:ph type="body" idx="1"/>
+          </p:nvPr>
+        </p:nvSpPr>
+        <p:spPr/>
+        <p:txBody>
+          <a:bodyPr/>
+          <a:lstStyle/>
+          <a:p>
+            <a:r>
+              <a:rPr lang="en-US" dirty="0"/>
+              <a:t>Scatter</a:t>
+            </a:r>
+          </a:p>
+          <a:p>
+            <a:r>
+              <a:rPr lang="en-US" dirty="0"/>
+              <a:t>- Changed to water year</a:t>
+            </a:r>
+          </a:p>
+          <a:p>
+            <a:endParaRPr lang="en-US" dirty="0"/>
+          </a:p>
+        </p:txBody>
+      </p:sp>
+      <p:sp>
+        <p:nvSpPr>
+          <p:cNvPr id="4" name="Slide Number Placeholder 3"/>
+          <p:cNvSpPr>
+            <a:spLocks noGrp="1"/>
+          </p:cNvSpPr>
+          <p:nvPr>
+            <p:ph type="sldNum" sz="quarter" idx="5"/>
+          </p:nvPr>
+        </p:nvSpPr>
+        <p:spPr/>
+        <p:txBody>
+          <a:bodyPr/>
+          <a:lstStyle/>
+          <a:p>
+            <a:fld id="{C73B4DB3-FE49-F748-A96F-EAC6C5DE80AC}" type="slidenum">
+              <a:rPr lang="en-US" smtClean="0"/>
+              <a:t>5</a:t>
+            </a:fld>
+            <a:endParaRPr lang="en-US"/>
+          </a:p>
+        </p:txBody>
+      </p:sp>
+    </p:spTree>
+    <p:extLst>
+      <p:ext uri="{BB962C8B-B14F-4D97-AF65-F5344CB8AC3E}">
+        <p14:creationId xmlns:p14="http://schemas.microsoft.com/office/powerpoint/2010/main" val="3829187643"/>
+      </p:ext>
+    </p:extLst>
+  </p:cSld>
+  <p:clrMapOvr>
+    <a:masterClrMapping/>
+  </p:clrMapOvr>
+</p:notes>
+</file>
+
+<file path=ppt/notesSlides/notesSlide3.xml><?xml version="1.0" encoding="utf-8"?>
+<p:notes xmlns:a="http://schemas.openxmlformats.org/drawingml/2006/main" xmlns:r="http://schemas.openxmlformats.org/officeDocument/2006/relationships" xmlns:p="http://schemas.openxmlformats.org/presentationml/2006/main">
+  <p:cSld>
+    <p:spTree>
+      <p:nvGrpSpPr>
+        <p:cNvPr id="1" name=""/>
+        <p:cNvGrpSpPr/>
+        <p:nvPr/>
+      </p:nvGrpSpPr>
+      <p:grpSpPr>
+        <a:xfrm>
+          <a:off x="0" y="0"/>
+          <a:ext cx="0" cy="0"/>
+          <a:chOff x="0" y="0"/>
+          <a:chExt cx="0" cy="0"/>
+        </a:xfrm>
+      </p:grpSpPr>
+      <p:sp>
+        <p:nvSpPr>
+          <p:cNvPr id="2" name="Slide Image Placeholder 1"/>
+          <p:cNvSpPr>
+            <a:spLocks noGrp="1" noRot="1" noChangeAspect="1"/>
+          </p:cNvSpPr>
+          <p:nvPr>
+            <p:ph type="sldImg"/>
+          </p:nvPr>
+        </p:nvSpPr>
+        <p:spPr/>
+      </p:sp>
+      <p:sp>
+        <p:nvSpPr>
+          <p:cNvPr id="3" name="Notes Placeholder 2"/>
+          <p:cNvSpPr>
+            <a:spLocks noGrp="1"/>
+          </p:cNvSpPr>
+          <p:nvPr>
+            <p:ph type="body" idx="1"/>
+          </p:nvPr>
+        </p:nvSpPr>
+        <p:spPr/>
+        <p:txBody>
+          <a:bodyPr/>
+          <a:lstStyle/>
+          <a:p>
+            <a:r>
+              <a:rPr lang="en-US" dirty="0"/>
+              <a:t>Scatter + dashed line</a:t>
+            </a:r>
+          </a:p>
+          <a:p>
+            <a:pPr marL="0" marR="0" lvl="0" indent="0" algn="l" defTabSz="914400" rtl="0" eaLnBrk="1" fontAlgn="auto" latinLnBrk="0" hangingPunct="1">
+              <a:lnSpc>
+                <a:spcPct val="100000"/>
+              </a:lnSpc>
+              <a:spcBef>
+                <a:spcPts val="0"/>
+              </a:spcBef>
+              <a:spcAft>
+                <a:spcPts val="0"/>
+              </a:spcAft>
+              <a:buClrTx/>
+              <a:buSzTx/>
+              <a:buFontTx/>
+              <a:buNone/>
+              <a:tabLst/>
+              <a:defRPr/>
+            </a:pPr>
+            <a:r>
+              <a:rPr lang="en-US" dirty="0"/>
+              <a:t>- Changed to water year</a:t>
+            </a:r>
+          </a:p>
+        </p:txBody>
+      </p:sp>
+      <p:sp>
+        <p:nvSpPr>
+          <p:cNvPr id="4" name="Slide Number Placeholder 3"/>
+          <p:cNvSpPr>
+            <a:spLocks noGrp="1"/>
+          </p:cNvSpPr>
+          <p:nvPr>
+            <p:ph type="sldNum" sz="quarter" idx="5"/>
+          </p:nvPr>
+        </p:nvSpPr>
+        <p:spPr/>
+        <p:txBody>
+          <a:bodyPr/>
+          <a:lstStyle/>
+          <a:p>
+            <a:fld id="{C73B4DB3-FE49-F748-A96F-EAC6C5DE80AC}" type="slidenum">
+              <a:rPr lang="en-US" smtClean="0"/>
+              <a:t>6</a:t>
+            </a:fld>
+            <a:endParaRPr lang="en-US"/>
+          </a:p>
+        </p:txBody>
+      </p:sp>
+    </p:spTree>
+    <p:extLst>
+      <p:ext uri="{BB962C8B-B14F-4D97-AF65-F5344CB8AC3E}">
+        <p14:creationId xmlns:p14="http://schemas.microsoft.com/office/powerpoint/2010/main" val="3350094135"/>
+      </p:ext>
+    </p:extLst>
+  </p:cSld>
+  <p:clrMapOvr>
+    <a:masterClrMapping/>
+  </p:clrMapOvr>
+</p:notes>
+</file>
+
+<file path=ppt/notesSlides/notesSlide4.xml><?xml version="1.0" encoding="utf-8"?>
+<p:notes xmlns:a="http://schemas.openxmlformats.org/drawingml/2006/main" xmlns:r="http://schemas.openxmlformats.org/officeDocument/2006/relationships" xmlns:p="http://schemas.openxmlformats.org/presentationml/2006/main">
+  <p:cSld>
+    <p:spTree>
+      <p:nvGrpSpPr>
+        <p:cNvPr id="1" name=""/>
+        <p:cNvGrpSpPr/>
+        <p:nvPr/>
+      </p:nvGrpSpPr>
+      <p:grpSpPr>
+        <a:xfrm>
+          <a:off x="0" y="0"/>
+          <a:ext cx="0" cy="0"/>
+          <a:chOff x="0" y="0"/>
+          <a:chExt cx="0" cy="0"/>
+        </a:xfrm>
+      </p:grpSpPr>
+      <p:sp>
+        <p:nvSpPr>
+          <p:cNvPr id="2" name="Slide Image Placeholder 1"/>
+          <p:cNvSpPr>
+            <a:spLocks noGrp="1" noRot="1" noChangeAspect="1"/>
+          </p:cNvSpPr>
+          <p:nvPr>
+            <p:ph type="sldImg"/>
+          </p:nvPr>
+        </p:nvSpPr>
+        <p:spPr/>
+      </p:sp>
+      <p:sp>
+        <p:nvSpPr>
+          <p:cNvPr id="3" name="Notes Placeholder 2"/>
+          <p:cNvSpPr>
+            <a:spLocks noGrp="1"/>
+          </p:cNvSpPr>
+          <p:nvPr>
+            <p:ph type="body" idx="1"/>
+          </p:nvPr>
+        </p:nvSpPr>
+        <p:spPr/>
+        <p:txBody>
+          <a:bodyPr/>
+          <a:lstStyle/>
+          <a:p>
+            <a:r>
+              <a:rPr lang="en-US" dirty="0"/>
+              <a:t>Row 8 graph</a:t>
+            </a:r>
+          </a:p>
+        </p:txBody>
+      </p:sp>
+      <p:sp>
+        <p:nvSpPr>
+          <p:cNvPr id="4" name="Slide Number Placeholder 3"/>
+          <p:cNvSpPr>
+            <a:spLocks noGrp="1"/>
+          </p:cNvSpPr>
+          <p:nvPr>
+            <p:ph type="sldNum" sz="quarter" idx="5"/>
+          </p:nvPr>
+        </p:nvSpPr>
+        <p:spPr/>
+        <p:txBody>
+          <a:bodyPr/>
+          <a:lstStyle/>
+          <a:p>
+            <a:fld id="{C73B4DB3-FE49-F748-A96F-EAC6C5DE80AC}" type="slidenum">
+              <a:rPr lang="en-US" smtClean="0"/>
+              <a:t>7</a:t>
+            </a:fld>
+            <a:endParaRPr lang="en-US"/>
+          </a:p>
+        </p:txBody>
+      </p:sp>
+    </p:spTree>
+    <p:extLst>
+      <p:ext uri="{BB962C8B-B14F-4D97-AF65-F5344CB8AC3E}">
+        <p14:creationId xmlns:p14="http://schemas.microsoft.com/office/powerpoint/2010/main" val="1219044030"/>
+      </p:ext>
+    </p:extLst>
+  </p:cSld>
+  <p:clrMapOvr>
+    <a:masterClrMapping/>
+  </p:clrMapOvr>
+</p:notes>
+</file>
+
+<file path=ppt/notesSlides/notesSlide5.xml><?xml version="1.0" encoding="utf-8"?>
+<p:notes xmlns:a="http://schemas.openxmlformats.org/drawingml/2006/main" xmlns:r="http://schemas.openxmlformats.org/officeDocument/2006/relationships" xmlns:p="http://schemas.openxmlformats.org/presentationml/2006/main">
+  <p:cSld>
+    <p:spTree>
+      <p:nvGrpSpPr>
+        <p:cNvPr id="1" name=""/>
+        <p:cNvGrpSpPr/>
+        <p:nvPr/>
+      </p:nvGrpSpPr>
+      <p:grpSpPr>
+        <a:xfrm>
+          <a:off x="0" y="0"/>
+          <a:ext cx="0" cy="0"/>
+          <a:chOff x="0" y="0"/>
+          <a:chExt cx="0" cy="0"/>
+        </a:xfrm>
+      </p:grpSpPr>
+      <p:sp>
+        <p:nvSpPr>
+          <p:cNvPr id="2" name="Slide Image Placeholder 1"/>
+          <p:cNvSpPr>
+            <a:spLocks noGrp="1" noRot="1" noChangeAspect="1"/>
+          </p:cNvSpPr>
+          <p:nvPr>
+            <p:ph type="sldImg"/>
+          </p:nvPr>
+        </p:nvSpPr>
+        <p:spPr/>
+      </p:sp>
+      <p:sp>
+        <p:nvSpPr>
+          <p:cNvPr id="3" name="Notes Placeholder 2"/>
+          <p:cNvSpPr>
+            <a:spLocks noGrp="1"/>
+          </p:cNvSpPr>
+          <p:nvPr>
+            <p:ph type="body" idx="1"/>
+          </p:nvPr>
+        </p:nvSpPr>
+        <p:spPr/>
+        <p:txBody>
+          <a:bodyPr/>
+          <a:lstStyle/>
+          <a:p>
+            <a:r>
+              <a:rPr lang="en-US" dirty="0"/>
+              <a:t>Row 9 graph</a:t>
+            </a:r>
+          </a:p>
+          <a:p>
+            <a:r>
+              <a:rPr lang="en-US" dirty="0"/>
+              <a:t>Note: MRHQ_snwmlt output does not have month (just 1 row per year), so can’t plot by water year</a:t>
+            </a:r>
+          </a:p>
+        </p:txBody>
+      </p:sp>
+      <p:sp>
+        <p:nvSpPr>
+          <p:cNvPr id="4" name="Slide Number Placeholder 3"/>
+          <p:cNvSpPr>
+            <a:spLocks noGrp="1"/>
+          </p:cNvSpPr>
+          <p:nvPr>
+            <p:ph type="sldNum" sz="quarter" idx="5"/>
+          </p:nvPr>
+        </p:nvSpPr>
+        <p:spPr/>
+        <p:txBody>
+          <a:bodyPr/>
+          <a:lstStyle/>
+          <a:p>
+            <a:fld id="{C73B4DB3-FE49-F748-A96F-EAC6C5DE80AC}" type="slidenum">
+              <a:rPr lang="en-US" smtClean="0"/>
+              <a:t>8</a:t>
+            </a:fld>
+            <a:endParaRPr lang="en-US"/>
+          </a:p>
+        </p:txBody>
+      </p:sp>
+    </p:spTree>
+    <p:extLst>
+      <p:ext uri="{BB962C8B-B14F-4D97-AF65-F5344CB8AC3E}">
+        <p14:creationId xmlns:p14="http://schemas.microsoft.com/office/powerpoint/2010/main" val="3457189688"/>
+      </p:ext>
+    </p:extLst>
+  </p:cSld>
+  <p:clrMapOvr>
+    <a:masterClrMapping/>
+  </p:clrMapOvr>
+</p:notes>
+</file>
+
+<file path=ppt/notesSlides/notesSlide6.xml><?xml version="1.0" encoding="utf-8"?>
+<p:notes xmlns:a="http://schemas.openxmlformats.org/drawingml/2006/main" xmlns:r="http://schemas.openxmlformats.org/officeDocument/2006/relationships" xmlns:p="http://schemas.openxmlformats.org/presentationml/2006/main">
+  <p:cSld>
+    <p:spTree>
+      <p:nvGrpSpPr>
+        <p:cNvPr id="1" name=""/>
+        <p:cNvGrpSpPr/>
+        <p:nvPr/>
+      </p:nvGrpSpPr>
+      <p:grpSpPr>
+        <a:xfrm>
+          <a:off x="0" y="0"/>
+          <a:ext cx="0" cy="0"/>
+          <a:chOff x="0" y="0"/>
+          <a:chExt cx="0" cy="0"/>
+        </a:xfrm>
+      </p:grpSpPr>
+      <p:sp>
+        <p:nvSpPr>
+          <p:cNvPr id="2" name="Slide Image Placeholder 1"/>
+          <p:cNvSpPr>
+            <a:spLocks noGrp="1" noRot="1" noChangeAspect="1"/>
+          </p:cNvSpPr>
+          <p:nvPr>
+            <p:ph type="sldImg"/>
+          </p:nvPr>
+        </p:nvSpPr>
+        <p:spPr/>
+      </p:sp>
+      <p:sp>
+        <p:nvSpPr>
+          <p:cNvPr id="3" name="Notes Placeholder 2"/>
+          <p:cNvSpPr>
+            <a:spLocks noGrp="1"/>
+          </p:cNvSpPr>
+          <p:nvPr>
+            <p:ph type="body" idx="1"/>
+          </p:nvPr>
+        </p:nvSpPr>
+        <p:spPr/>
+        <p:txBody>
+          <a:bodyPr/>
+          <a:lstStyle/>
+          <a:p>
+            <a:r>
+              <a:rPr lang="en-US" dirty="0"/>
+              <a:t>Row 10 graph</a:t>
+            </a:r>
+          </a:p>
+          <a:p>
+            <a:r>
+              <a:rPr lang="en-US" dirty="0"/>
+              <a:t>Note: MRHqsnoset output does not have month (just 1 row per year), so can’t plot by water year</a:t>
+            </a:r>
+          </a:p>
+          <a:p>
+            <a:r>
+              <a:rPr lang="en-US" dirty="0"/>
+              <a:t>Also MRHqsnoset has two column names I don’t know</a:t>
+            </a:r>
+          </a:p>
+        </p:txBody>
+      </p:sp>
+      <p:sp>
+        <p:nvSpPr>
+          <p:cNvPr id="4" name="Slide Number Placeholder 3"/>
+          <p:cNvSpPr>
+            <a:spLocks noGrp="1"/>
+          </p:cNvSpPr>
+          <p:nvPr>
+            <p:ph type="sldNum" sz="quarter" idx="5"/>
+          </p:nvPr>
+        </p:nvSpPr>
+        <p:spPr/>
+        <p:txBody>
+          <a:bodyPr/>
+          <a:lstStyle/>
+          <a:p>
+            <a:fld id="{C73B4DB3-FE49-F748-A96F-EAC6C5DE80AC}" type="slidenum">
+              <a:rPr lang="en-US" smtClean="0"/>
+              <a:t>9</a:t>
+            </a:fld>
+            <a:endParaRPr lang="en-US"/>
+          </a:p>
+        </p:txBody>
+      </p:sp>
+    </p:spTree>
+    <p:extLst>
+      <p:ext uri="{BB962C8B-B14F-4D97-AF65-F5344CB8AC3E}">
+        <p14:creationId xmlns:p14="http://schemas.microsoft.com/office/powerpoint/2010/main" val="3182467296"/>
+      </p:ext>
+    </p:extLst>
+  </p:cSld>
+  <p:clrMapOvr>
+    <a:masterClrMapping/>
+  </p:clrMapOvr>
+</p:notes>
+</file>
+
+<file path=ppt/notesSlides/notesSlide7.xml><?xml version="1.0" encoding="utf-8"?>
+<p:notes xmlns:a="http://schemas.openxmlformats.org/drawingml/2006/main" xmlns:r="http://schemas.openxmlformats.org/officeDocument/2006/relationships" xmlns:p="http://schemas.openxmlformats.org/presentationml/2006/main">
+  <p:cSld>
+    <p:spTree>
+      <p:nvGrpSpPr>
+        <p:cNvPr id="1" name=""/>
+        <p:cNvGrpSpPr/>
+        <p:nvPr/>
+      </p:nvGrpSpPr>
+      <p:grpSpPr>
+        <a:xfrm>
+          <a:off x="0" y="0"/>
+          <a:ext cx="0" cy="0"/>
+          <a:chOff x="0" y="0"/>
+          <a:chExt cx="0" cy="0"/>
+        </a:xfrm>
+      </p:grpSpPr>
+      <p:sp>
+        <p:nvSpPr>
+          <p:cNvPr id="2" name="Slide Image Placeholder 1"/>
+          <p:cNvSpPr>
+            <a:spLocks noGrp="1" noRot="1" noChangeAspect="1"/>
+          </p:cNvSpPr>
+          <p:nvPr>
+            <p:ph type="sldImg"/>
+          </p:nvPr>
+        </p:nvSpPr>
+        <p:spPr/>
+      </p:sp>
+      <p:sp>
+        <p:nvSpPr>
+          <p:cNvPr id="3" name="Notes Placeholder 2"/>
+          <p:cNvSpPr>
+            <a:spLocks noGrp="1"/>
+          </p:cNvSpPr>
+          <p:nvPr>
+            <p:ph type="body" idx="1"/>
+          </p:nvPr>
+        </p:nvSpPr>
+        <p:spPr/>
+        <p:txBody>
+          <a:bodyPr/>
+          <a:lstStyle/>
+          <a:p>
+            <a:r>
+              <a:rPr lang="en-US" dirty="0"/>
+              <a:t>Row </a:t>
+            </a:r>
+            <a:r>
+              <a:rPr lang="en-US"/>
+              <a:t>16 graph</a:t>
+            </a:r>
+          </a:p>
+          <a:p>
+            <a:r>
+              <a:rPr lang="en-US" dirty="0"/>
+              <a:t>Complete period of record</a:t>
+            </a:r>
+          </a:p>
+        </p:txBody>
+      </p:sp>
+      <p:sp>
+        <p:nvSpPr>
+          <p:cNvPr id="4" name="Slide Number Placeholder 3"/>
+          <p:cNvSpPr>
+            <a:spLocks noGrp="1"/>
+          </p:cNvSpPr>
+          <p:nvPr>
+            <p:ph type="sldNum" sz="quarter" idx="5"/>
+          </p:nvPr>
+        </p:nvSpPr>
+        <p:spPr/>
+        <p:txBody>
+          <a:bodyPr/>
+          <a:lstStyle/>
+          <a:p>
+            <a:fld id="{C73B4DB3-FE49-F748-A96F-EAC6C5DE80AC}" type="slidenum">
+              <a:rPr lang="en-US" smtClean="0"/>
+              <a:t>11</a:t>
+            </a:fld>
+            <a:endParaRPr lang="en-US"/>
+          </a:p>
+        </p:txBody>
+      </p:sp>
+    </p:spTree>
+    <p:extLst>
+      <p:ext uri="{BB962C8B-B14F-4D97-AF65-F5344CB8AC3E}">
+        <p14:creationId xmlns:p14="http://schemas.microsoft.com/office/powerpoint/2010/main" val="999206801"/>
       </p:ext>
     </p:extLst>
   </p:cSld>
@@ -740,7 +1325,7 @@
           <a:p>
             <a:fld id="{9E04027F-2BA9-C54E-B69B-A2884180022D}" type="datetimeFigureOut">
               <a:rPr lang="en-US" smtClean="0"/>
-              <a:t>4/18/22</a:t>
+              <a:t>4/25/22</a:t>
             </a:fld>
             <a:endParaRPr lang="en-US"/>
           </a:p>
@@ -910,7 +1495,7 @@
           <a:p>
             <a:fld id="{9E04027F-2BA9-C54E-B69B-A2884180022D}" type="datetimeFigureOut">
               <a:rPr lang="en-US" smtClean="0"/>
-              <a:t>4/18/22</a:t>
+              <a:t>4/25/22</a:t>
             </a:fld>
             <a:endParaRPr lang="en-US"/>
           </a:p>
@@ -1090,7 +1675,7 @@
           <a:p>
             <a:fld id="{9E04027F-2BA9-C54E-B69B-A2884180022D}" type="datetimeFigureOut">
               <a:rPr lang="en-US" smtClean="0"/>
-              <a:t>4/18/22</a:t>
+              <a:t>4/25/22</a:t>
             </a:fld>
             <a:endParaRPr lang="en-US"/>
           </a:p>
@@ -1260,7 +1845,7 @@
           <a:p>
             <a:fld id="{9E04027F-2BA9-C54E-B69B-A2884180022D}" type="datetimeFigureOut">
               <a:rPr lang="en-US" smtClean="0"/>
-              <a:t>4/18/22</a:t>
+              <a:t>4/25/22</a:t>
             </a:fld>
             <a:endParaRPr lang="en-US"/>
           </a:p>
@@ -1528,7 +2113,7 @@
           <a:p>
             <a:fld id="{9E04027F-2BA9-C54E-B69B-A2884180022D}" type="datetimeFigureOut">
               <a:rPr lang="en-US" smtClean="0"/>
-              <a:t>4/18/22</a:t>
+              <a:t>4/25/22</a:t>
             </a:fld>
             <a:endParaRPr lang="en-US"/>
           </a:p>
@@ -1760,7 +2345,7 @@
           <a:p>
             <a:fld id="{9E04027F-2BA9-C54E-B69B-A2884180022D}" type="datetimeFigureOut">
               <a:rPr lang="en-US" smtClean="0"/>
-              <a:t>4/18/22</a:t>
+              <a:t>4/25/22</a:t>
             </a:fld>
             <a:endParaRPr lang="en-US"/>
           </a:p>
@@ -2119,7 +2704,7 @@
           <a:p>
             <a:fld id="{9E04027F-2BA9-C54E-B69B-A2884180022D}" type="datetimeFigureOut">
               <a:rPr lang="en-US" smtClean="0"/>
-              <a:t>4/18/22</a:t>
+              <a:t>4/25/22</a:t>
             </a:fld>
             <a:endParaRPr lang="en-US"/>
           </a:p>
@@ -2260,7 +2845,7 @@
           <a:p>
             <a:fld id="{9E04027F-2BA9-C54E-B69B-A2884180022D}" type="datetimeFigureOut">
               <a:rPr lang="en-US" smtClean="0"/>
-              <a:t>4/18/22</a:t>
+              <a:t>4/25/22</a:t>
             </a:fld>
             <a:endParaRPr lang="en-US"/>
           </a:p>
@@ -2355,7 +2940,7 @@
           <a:p>
             <a:fld id="{9E04027F-2BA9-C54E-B69B-A2884180022D}" type="datetimeFigureOut">
               <a:rPr lang="en-US" smtClean="0"/>
-              <a:t>4/18/22</a:t>
+              <a:t>4/25/22</a:t>
             </a:fld>
             <a:endParaRPr lang="en-US"/>
           </a:p>
@@ -2712,7 +3297,7 @@
           <a:p>
             <a:fld id="{9E04027F-2BA9-C54E-B69B-A2884180022D}" type="datetimeFigureOut">
               <a:rPr lang="en-US" smtClean="0"/>
-              <a:t>4/18/22</a:t>
+              <a:t>4/25/22</a:t>
             </a:fld>
             <a:endParaRPr lang="en-US"/>
           </a:p>
@@ -3069,7 +3654,7 @@
           <a:p>
             <a:fld id="{9E04027F-2BA9-C54E-B69B-A2884180022D}" type="datetimeFigureOut">
               <a:rPr lang="en-US" smtClean="0"/>
-              <a:t>4/18/22</a:t>
+              <a:t>4/25/22</a:t>
             </a:fld>
             <a:endParaRPr lang="en-US"/>
           </a:p>
@@ -3311,7 +3896,7 @@
           <a:p>
             <a:fld id="{9E04027F-2BA9-C54E-B69B-A2884180022D}" type="datetimeFigureOut">
               <a:rPr lang="en-US" smtClean="0"/>
-              <a:t>4/18/22</a:t>
+              <a:t>4/25/22</a:t>
             </a:fld>
             <a:endParaRPr lang="en-US"/>
           </a:p>
@@ -3829,6 +4414,403 @@
 </p:sld>
 </file>
 
+<file path=ppt/slides/slide10.xml><?xml version="1.0" encoding="utf-8"?>
+<p:sld xmlns:a="http://schemas.openxmlformats.org/drawingml/2006/main" xmlns:r="http://schemas.openxmlformats.org/officeDocument/2006/relationships" xmlns:p="http://schemas.openxmlformats.org/presentationml/2006/main">
+  <p:cSld>
+    <p:spTree>
+      <p:nvGrpSpPr>
+        <p:cNvPr id="1" name=""/>
+        <p:cNvGrpSpPr/>
+        <p:nvPr/>
+      </p:nvGrpSpPr>
+      <p:grpSpPr>
+        <a:xfrm>
+          <a:off x="0" y="0"/>
+          <a:ext cx="0" cy="0"/>
+          <a:chOff x="0" y="0"/>
+          <a:chExt cx="0" cy="0"/>
+        </a:xfrm>
+      </p:grpSpPr>
+      <p:sp>
+        <p:nvSpPr>
+          <p:cNvPr id="2" name="Title 1">
+            <a:extLst>
+              <a:ext uri="{FF2B5EF4-FFF2-40B4-BE49-F238E27FC236}">
+                <a16:creationId xmlns:a16="http://schemas.microsoft.com/office/drawing/2014/main" id="{BA288ADE-4ABA-D516-FA2A-449EF87E9C64}"/>
+              </a:ext>
+            </a:extLst>
+          </p:cNvPr>
+          <p:cNvSpPr>
+            <a:spLocks noGrp="1"/>
+          </p:cNvSpPr>
+          <p:nvPr>
+            <p:ph type="title"/>
+          </p:nvPr>
+        </p:nvSpPr>
+        <p:spPr/>
+        <p:txBody>
+          <a:bodyPr/>
+          <a:lstStyle/>
+          <a:p>
+            <a:endParaRPr lang="en-US" dirty="0"/>
+          </a:p>
+        </p:txBody>
+      </p:sp>
+      <p:sp>
+        <p:nvSpPr>
+          <p:cNvPr id="3" name="Content Placeholder 2">
+            <a:extLst>
+              <a:ext uri="{FF2B5EF4-FFF2-40B4-BE49-F238E27FC236}">
+                <a16:creationId xmlns:a16="http://schemas.microsoft.com/office/drawing/2014/main" id="{8E1636CB-06EC-7A4E-4AEE-F8ED7C8098DB}"/>
+              </a:ext>
+            </a:extLst>
+          </p:cNvPr>
+          <p:cNvSpPr>
+            <a:spLocks noGrp="1"/>
+          </p:cNvSpPr>
+          <p:nvPr>
+            <p:ph idx="1"/>
+          </p:nvPr>
+        </p:nvSpPr>
+        <p:spPr/>
+        <p:txBody>
+          <a:bodyPr/>
+          <a:lstStyle/>
+          <a:p>
+            <a:r>
+              <a:rPr lang="en-US" dirty="0"/>
+              <a:t>Rows 11-12 </a:t>
+            </a:r>
+            <a:r>
+              <a:rPr lang="en-US" dirty="0">
+                <a:sym typeface="Wingdings" pitchFamily="2" charset="2"/>
+              </a:rPr>
+              <a:t> not sure which output file to use/what column headers are</a:t>
+            </a:r>
+          </a:p>
+          <a:p>
+            <a:r>
+              <a:rPr lang="en-US" dirty="0">
+                <a:sym typeface="Wingdings" pitchFamily="2" charset="2"/>
+              </a:rPr>
+              <a:t>Rows 13-14 I think first need ^</a:t>
+            </a:r>
+            <a:endParaRPr lang="en-US" dirty="0"/>
+          </a:p>
+        </p:txBody>
+      </p:sp>
+    </p:spTree>
+    <p:extLst>
+      <p:ext uri="{BB962C8B-B14F-4D97-AF65-F5344CB8AC3E}">
+        <p14:creationId xmlns:p14="http://schemas.microsoft.com/office/powerpoint/2010/main" val="2130137881"/>
+      </p:ext>
+    </p:extLst>
+  </p:cSld>
+  <p:clrMapOvr>
+    <a:masterClrMapping/>
+  </p:clrMapOvr>
+</p:sld>
+</file>
+
+<file path=ppt/slides/slide11.xml><?xml version="1.0" encoding="utf-8"?>
+<p:sld xmlns:a="http://schemas.openxmlformats.org/drawingml/2006/main" xmlns:r="http://schemas.openxmlformats.org/officeDocument/2006/relationships" xmlns:p="http://schemas.openxmlformats.org/presentationml/2006/main">
+  <p:cSld>
+    <p:bg>
+      <p:bgPr>
+        <a:solidFill>
+          <a:schemeClr val="bg1">
+            <a:lumMod val="95000"/>
+          </a:schemeClr>
+        </a:solidFill>
+        <a:effectLst/>
+      </p:bgPr>
+    </p:bg>
+    <p:spTree>
+      <p:nvGrpSpPr>
+        <p:cNvPr id="1" name=""/>
+        <p:cNvGrpSpPr/>
+        <p:nvPr/>
+      </p:nvGrpSpPr>
+      <p:grpSpPr>
+        <a:xfrm>
+          <a:off x="0" y="0"/>
+          <a:ext cx="0" cy="0"/>
+          <a:chOff x="0" y="0"/>
+          <a:chExt cx="0" cy="0"/>
+        </a:xfrm>
+      </p:grpSpPr>
+      <p:sp>
+        <p:nvSpPr>
+          <p:cNvPr id="9" name="Rectangle 8">
+            <a:extLst>
+              <a:ext uri="{FF2B5EF4-FFF2-40B4-BE49-F238E27FC236}">
+                <a16:creationId xmlns:a16="http://schemas.microsoft.com/office/drawing/2014/main" id="{65041AB2-A9B4-4D3F-B120-38E7860A8F1A}"/>
+              </a:ext>
+              <a:ext uri="{C183D7F6-B498-43B3-948B-1728B52AA6E4}">
+                <adec:decorative xmlns:adec="http://schemas.microsoft.com/office/drawing/2017/decorative" val="1"/>
+              </a:ext>
+            </a:extLst>
+          </p:cNvPr>
+          <p:cNvSpPr>
+            <a:spLocks noGrp="1" noRot="1" noChangeAspect="1" noMove="1" noResize="1" noEditPoints="1" noAdjustHandles="1" noChangeArrowheads="1" noChangeShapeType="1" noTextEdit="1"/>
+          </p:cNvSpPr>
+          <p:nvPr>
+            <p:extLst>
+              <p:ext uri="{386F3935-93C4-4BCD-93E2-E3B085C9AB24}">
+                <p16:designElem xmlns:p16="http://schemas.microsoft.com/office/powerpoint/2015/main" val="1"/>
+              </p:ext>
+            </p:extLst>
+          </p:nvPr>
+        </p:nvSpPr>
+        <p:spPr>
+          <a:xfrm>
+            <a:off x="804334" y="804334"/>
+            <a:ext cx="10583332" cy="5249332"/>
+          </a:xfrm>
+          <a:prstGeom prst="rect">
+            <a:avLst/>
+          </a:prstGeom>
+          <a:solidFill>
+            <a:srgbClr val="FFFFFF"/>
+          </a:solidFill>
+          <a:ln w="19050" cap="sq">
+            <a:solidFill>
+              <a:schemeClr val="tx1">
+                <a:lumMod val="75000"/>
+                <a:lumOff val="25000"/>
+              </a:schemeClr>
+            </a:solidFill>
+            <a:miter lim="800000"/>
+          </a:ln>
+        </p:spPr>
+        <p:style>
+          <a:lnRef idx="2">
+            <a:schemeClr val="accent1">
+              <a:shade val="50000"/>
+            </a:schemeClr>
+          </a:lnRef>
+          <a:fillRef idx="1">
+            <a:schemeClr val="accent1"/>
+          </a:fillRef>
+          <a:effectRef idx="0">
+            <a:schemeClr val="accent1"/>
+          </a:effectRef>
+          <a:fontRef idx="minor">
+            <a:schemeClr val="lt1"/>
+          </a:fontRef>
+        </p:style>
+        <p:txBody>
+          <a:bodyPr rtlCol="0" anchor="ctr"/>
+          <a:lstStyle/>
+          <a:p>
+            <a:pPr algn="ctr"/>
+            <a:endParaRPr lang="en-US"/>
+          </a:p>
+        </p:txBody>
+      </p:sp>
+      <p:pic>
+        <p:nvPicPr>
+          <p:cNvPr id="4" name="Picture 3">
+            <a:extLst>
+              <a:ext uri="{FF2B5EF4-FFF2-40B4-BE49-F238E27FC236}">
+                <a16:creationId xmlns:a16="http://schemas.microsoft.com/office/drawing/2014/main" id="{F9623900-B1DD-CC82-AC16-71C7D44197C6}"/>
+              </a:ext>
+            </a:extLst>
+          </p:cNvPr>
+          <p:cNvPicPr>
+            <a:picLocks noChangeAspect="1"/>
+          </p:cNvPicPr>
+          <p:nvPr/>
+        </p:nvPicPr>
+        <p:blipFill>
+          <a:blip r:embed="rId3"/>
+          <a:stretch>
+            <a:fillRect/>
+          </a:stretch>
+        </p:blipFill>
+        <p:spPr>
+          <a:xfrm>
+            <a:off x="1126236" y="1378972"/>
+            <a:ext cx="9939528" cy="4100055"/>
+          </a:xfrm>
+          <a:prstGeom prst="rect">
+            <a:avLst/>
+          </a:prstGeom>
+        </p:spPr>
+      </p:pic>
+    </p:spTree>
+    <p:extLst>
+      <p:ext uri="{BB962C8B-B14F-4D97-AF65-F5344CB8AC3E}">
+        <p14:creationId xmlns:p14="http://schemas.microsoft.com/office/powerpoint/2010/main" val="3889947905"/>
+      </p:ext>
+    </p:extLst>
+  </p:cSld>
+  <p:clrMapOvr>
+    <a:masterClrMapping/>
+  </p:clrMapOvr>
+</p:sld>
+</file>
+
+<file path=ppt/slides/slide12.xml><?xml version="1.0" encoding="utf-8"?>
+<p:sld xmlns:a="http://schemas.openxmlformats.org/drawingml/2006/main" xmlns:r="http://schemas.openxmlformats.org/officeDocument/2006/relationships" xmlns:p="http://schemas.openxmlformats.org/presentationml/2006/main">
+  <p:cSld>
+    <p:spTree>
+      <p:nvGrpSpPr>
+        <p:cNvPr id="1" name=""/>
+        <p:cNvGrpSpPr/>
+        <p:nvPr/>
+      </p:nvGrpSpPr>
+      <p:grpSpPr>
+        <a:xfrm>
+          <a:off x="0" y="0"/>
+          <a:ext cx="0" cy="0"/>
+          <a:chOff x="0" y="0"/>
+          <a:chExt cx="0" cy="0"/>
+        </a:xfrm>
+      </p:grpSpPr>
+      <p:sp>
+        <p:nvSpPr>
+          <p:cNvPr id="2" name="Title 1">
+            <a:extLst>
+              <a:ext uri="{FF2B5EF4-FFF2-40B4-BE49-F238E27FC236}">
+                <a16:creationId xmlns:a16="http://schemas.microsoft.com/office/drawing/2014/main" id="{1F52B72B-9C30-9117-11B0-19747A6268F0}"/>
+              </a:ext>
+            </a:extLst>
+          </p:cNvPr>
+          <p:cNvSpPr>
+            <a:spLocks noGrp="1"/>
+          </p:cNvSpPr>
+          <p:nvPr>
+            <p:ph type="title"/>
+          </p:nvPr>
+        </p:nvSpPr>
+        <p:spPr/>
+        <p:txBody>
+          <a:bodyPr/>
+          <a:lstStyle/>
+          <a:p>
+            <a:endParaRPr lang="en-US"/>
+          </a:p>
+        </p:txBody>
+      </p:sp>
+      <p:sp>
+        <p:nvSpPr>
+          <p:cNvPr id="3" name="Content Placeholder 2">
+            <a:extLst>
+              <a:ext uri="{FF2B5EF4-FFF2-40B4-BE49-F238E27FC236}">
+                <a16:creationId xmlns:a16="http://schemas.microsoft.com/office/drawing/2014/main" id="{4CCD344F-34FE-AC70-1642-2146993604BE}"/>
+              </a:ext>
+            </a:extLst>
+          </p:cNvPr>
+          <p:cNvSpPr>
+            <a:spLocks noGrp="1"/>
+          </p:cNvSpPr>
+          <p:nvPr>
+            <p:ph idx="1"/>
+          </p:nvPr>
+        </p:nvSpPr>
+        <p:spPr/>
+        <p:txBody>
+          <a:bodyPr/>
+          <a:lstStyle/>
+          <a:p>
+            <a:endParaRPr lang="en-US"/>
+          </a:p>
+        </p:txBody>
+      </p:sp>
+    </p:spTree>
+    <p:extLst>
+      <p:ext uri="{BB962C8B-B14F-4D97-AF65-F5344CB8AC3E}">
+        <p14:creationId xmlns:p14="http://schemas.microsoft.com/office/powerpoint/2010/main" val="566295777"/>
+      </p:ext>
+    </p:extLst>
+  </p:cSld>
+  <p:clrMapOvr>
+    <a:masterClrMapping/>
+  </p:clrMapOvr>
+</p:sld>
+</file>
+
+<file path=ppt/slides/slide13.xml><?xml version="1.0" encoding="utf-8"?>
+<p:sld xmlns:a="http://schemas.openxmlformats.org/drawingml/2006/main" xmlns:r="http://schemas.openxmlformats.org/officeDocument/2006/relationships" xmlns:p="http://schemas.openxmlformats.org/presentationml/2006/main">
+  <p:cSld>
+    <p:spTree>
+      <p:nvGrpSpPr>
+        <p:cNvPr id="1" name=""/>
+        <p:cNvGrpSpPr/>
+        <p:nvPr/>
+      </p:nvGrpSpPr>
+      <p:grpSpPr>
+        <a:xfrm>
+          <a:off x="0" y="0"/>
+          <a:ext cx="0" cy="0"/>
+          <a:chOff x="0" y="0"/>
+          <a:chExt cx="0" cy="0"/>
+        </a:xfrm>
+      </p:grpSpPr>
+      <p:sp>
+        <p:nvSpPr>
+          <p:cNvPr id="2" name="Title 1">
+            <a:extLst>
+              <a:ext uri="{FF2B5EF4-FFF2-40B4-BE49-F238E27FC236}">
+                <a16:creationId xmlns:a16="http://schemas.microsoft.com/office/drawing/2014/main" id="{F959619F-2EE1-04B1-E783-B04044872119}"/>
+              </a:ext>
+            </a:extLst>
+          </p:cNvPr>
+          <p:cNvSpPr>
+            <a:spLocks noGrp="1"/>
+          </p:cNvSpPr>
+          <p:nvPr>
+            <p:ph type="title"/>
+          </p:nvPr>
+        </p:nvSpPr>
+        <p:spPr/>
+        <p:txBody>
+          <a:bodyPr/>
+          <a:lstStyle/>
+          <a:p>
+            <a:endParaRPr lang="en-US"/>
+          </a:p>
+        </p:txBody>
+      </p:sp>
+      <p:sp>
+        <p:nvSpPr>
+          <p:cNvPr id="3" name="Content Placeholder 2">
+            <a:extLst>
+              <a:ext uri="{FF2B5EF4-FFF2-40B4-BE49-F238E27FC236}">
+                <a16:creationId xmlns:a16="http://schemas.microsoft.com/office/drawing/2014/main" id="{DBA7D92D-9CC0-7502-B0AA-585D666223D3}"/>
+              </a:ext>
+            </a:extLst>
+          </p:cNvPr>
+          <p:cNvSpPr>
+            <a:spLocks noGrp="1"/>
+          </p:cNvSpPr>
+          <p:nvPr>
+            <p:ph idx="1"/>
+          </p:nvPr>
+        </p:nvSpPr>
+        <p:spPr/>
+        <p:txBody>
+          <a:bodyPr/>
+          <a:lstStyle/>
+          <a:p>
+            <a:endParaRPr lang="en-US"/>
+          </a:p>
+        </p:txBody>
+      </p:sp>
+    </p:spTree>
+    <p:extLst>
+      <p:ext uri="{BB962C8B-B14F-4D97-AF65-F5344CB8AC3E}">
+        <p14:creationId xmlns:p14="http://schemas.microsoft.com/office/powerpoint/2010/main" val="1676652115"/>
+      </p:ext>
+    </p:extLst>
+  </p:cSld>
+  <p:clrMapOvr>
+    <a:masterClrMapping/>
+  </p:clrMapOvr>
+</p:sld>
+</file>
+
 <file path=ppt/slides/slide2.xml><?xml version="1.0" encoding="utf-8"?>
 <p:sld xmlns:a="http://schemas.openxmlformats.org/drawingml/2006/main" xmlns:r="http://schemas.openxmlformats.org/officeDocument/2006/relationships" xmlns:p="http://schemas.openxmlformats.org/presentationml/2006/main">
   <p:cSld>
@@ -3978,7 +4960,7 @@
       </p:grpSpPr>
       <p:sp>
         <p:nvSpPr>
-          <p:cNvPr id="9" name="Rectangle 8">
+          <p:cNvPr id="10" name="Rectangle 9">
             <a:extLst>
               <a:ext uri="{FF2B5EF4-FFF2-40B4-BE49-F238E27FC236}">
                 <a16:creationId xmlns:a16="http://schemas.microsoft.com/office/drawing/2014/main" id="{65041AB2-A9B4-4D3F-B120-38E7860A8F1A}"/>
@@ -4047,10 +5029,10 @@
       </p:sp>
       <p:pic>
         <p:nvPicPr>
-          <p:cNvPr id="4" name="Picture 3">
+          <p:cNvPr id="5" name="Picture 4">
             <a:extLst>
               <a:ext uri="{FF2B5EF4-FFF2-40B4-BE49-F238E27FC236}">
-                <a16:creationId xmlns:a16="http://schemas.microsoft.com/office/drawing/2014/main" id="{0DE63699-B566-D60D-612C-BCF2708A9A9F}"/>
+                <a16:creationId xmlns:a16="http://schemas.microsoft.com/office/drawing/2014/main" id="{9817D2F1-0E68-4331-10F1-0C4D0CA33F88}"/>
               </a:ext>
             </a:extLst>
           </p:cNvPr>
@@ -4067,8 +5049,8 @@
         </p:blipFill>
         <p:spPr>
           <a:xfrm>
-            <a:off x="2017614" y="1124712"/>
-            <a:ext cx="8156771" cy="4608576"/>
+            <a:off x="2730745" y="1124712"/>
+            <a:ext cx="6730510" cy="4608576"/>
           </a:xfrm>
           <a:prstGeom prst="rect">
             <a:avLst/>
@@ -4078,7 +5060,7 @@
     </p:spTree>
     <p:extLst>
       <p:ext uri="{BB962C8B-B14F-4D97-AF65-F5344CB8AC3E}">
-        <p14:creationId xmlns:p14="http://schemas.microsoft.com/office/powerpoint/2010/main" val="2361562426"/>
+        <p14:creationId xmlns:p14="http://schemas.microsoft.com/office/powerpoint/2010/main" val="161804758"/>
       </p:ext>
     </p:extLst>
   </p:cSld>
@@ -4189,7 +5171,7 @@
           <p:cNvPr id="4" name="Picture 3">
             <a:extLst>
               <a:ext uri="{FF2B5EF4-FFF2-40B4-BE49-F238E27FC236}">
-                <a16:creationId xmlns:a16="http://schemas.microsoft.com/office/drawing/2014/main" id="{A66E6E75-A0AA-BFED-EDB2-F6C1FBA0BC6F}"/>
+                <a16:creationId xmlns:a16="http://schemas.microsoft.com/office/drawing/2014/main" id="{3EA296EF-8E0B-E240-41A3-AC14E5155620}"/>
               </a:ext>
             </a:extLst>
           </p:cNvPr>
@@ -4199,15 +5181,15 @@
           <p:nvPr/>
         </p:nvPicPr>
         <p:blipFill>
-          <a:blip r:embed="rId2"/>
+          <a:blip r:embed="rId3"/>
           <a:stretch>
             <a:fillRect/>
           </a:stretch>
         </p:blipFill>
         <p:spPr>
           <a:xfrm>
-            <a:off x="2017614" y="1124712"/>
-            <a:ext cx="8156771" cy="4608576"/>
+            <a:off x="2730745" y="1124712"/>
+            <a:ext cx="6730510" cy="4608576"/>
           </a:xfrm>
           <a:prstGeom prst="rect">
             <a:avLst/>
@@ -4217,7 +5199,7 @@
     </p:spTree>
     <p:extLst>
       <p:ext uri="{BB962C8B-B14F-4D97-AF65-F5344CB8AC3E}">
-        <p14:creationId xmlns:p14="http://schemas.microsoft.com/office/powerpoint/2010/main" val="1570336642"/>
+        <p14:creationId xmlns:p14="http://schemas.microsoft.com/office/powerpoint/2010/main" val="3904881085"/>
       </p:ext>
     </p:extLst>
   </p:cSld>
@@ -4230,6 +5212,16 @@
 <file path=ppt/slides/slide6.xml><?xml version="1.0" encoding="utf-8"?>
 <p:sld xmlns:a="http://schemas.openxmlformats.org/drawingml/2006/main" xmlns:r="http://schemas.openxmlformats.org/officeDocument/2006/relationships" xmlns:p="http://schemas.openxmlformats.org/presentationml/2006/main">
   <p:cSld>
+    <p:bg>
+      <p:bgPr>
+        <a:solidFill>
+          <a:schemeClr val="bg1">
+            <a:lumMod val="95000"/>
+          </a:schemeClr>
+        </a:solidFill>
+        <a:effectLst/>
+      </p:bgPr>
+    </p:bg>
     <p:spTree>
       <p:nvGrpSpPr>
         <p:cNvPr id="1" name=""/>
@@ -4246,36 +5238,107 @@
       </p:grpSpPr>
       <p:sp>
         <p:nvSpPr>
-          <p:cNvPr id="3" name="Content Placeholder 2">
+          <p:cNvPr id="11" name="Rectangle 10">
             <a:extLst>
               <a:ext uri="{FF2B5EF4-FFF2-40B4-BE49-F238E27FC236}">
-                <a16:creationId xmlns:a16="http://schemas.microsoft.com/office/drawing/2014/main" id="{70261A28-BBDB-68C2-9E3B-8A6A2EB7C823}"/>
+                <a16:creationId xmlns:a16="http://schemas.microsoft.com/office/drawing/2014/main" id="{65041AB2-A9B4-4D3F-B120-38E7860A8F1A}"/>
+              </a:ext>
+              <a:ext uri="{C183D7F6-B498-43B3-948B-1728B52AA6E4}">
+                <adec:decorative xmlns:adec="http://schemas.microsoft.com/office/drawing/2017/decorative" val="1"/>
               </a:ext>
             </a:extLst>
           </p:cNvPr>
           <p:cNvSpPr>
-            <a:spLocks noGrp="1"/>
-          </p:cNvSpPr>
-          <p:nvPr>
-            <p:ph idx="1"/>
-          </p:nvPr>
-        </p:nvSpPr>
-        <p:spPr/>
-        <p:txBody>
-          <a:bodyPr/>
-          <a:lstStyle/>
-          <a:p>
-            <a:r>
-              <a:rPr lang="en-US" dirty="0"/>
-              <a:t>Row 8 – value or time series?</a:t>
-            </a:r>
-          </a:p>
-        </p:txBody>
-      </p:sp>
+            <a:spLocks noGrp="1" noRot="1" noChangeAspect="1" noMove="1" noResize="1" noEditPoints="1" noAdjustHandles="1" noChangeArrowheads="1" noChangeShapeType="1" noTextEdit="1"/>
+          </p:cNvSpPr>
+          <p:nvPr>
+            <p:extLst>
+              <p:ext uri="{386F3935-93C4-4BCD-93E2-E3B085C9AB24}">
+                <p16:designElem xmlns:p16="http://schemas.microsoft.com/office/powerpoint/2015/main" val="1"/>
+              </p:ext>
+            </p:extLst>
+          </p:nvPr>
+        </p:nvSpPr>
+        <p:spPr>
+          <a:xfrm>
+            <a:off x="804334" y="804334"/>
+            <a:ext cx="10583332" cy="5249332"/>
+          </a:xfrm>
+          <a:prstGeom prst="rect">
+            <a:avLst/>
+          </a:prstGeom>
+          <a:solidFill>
+            <a:srgbClr val="FFFFFF"/>
+          </a:solidFill>
+          <a:ln w="19050" cap="sq">
+            <a:solidFill>
+              <a:schemeClr val="tx1">
+                <a:lumMod val="75000"/>
+                <a:lumOff val="25000"/>
+              </a:schemeClr>
+            </a:solidFill>
+            <a:miter lim="800000"/>
+          </a:ln>
+        </p:spPr>
+        <p:style>
+          <a:lnRef idx="2">
+            <a:schemeClr val="accent1">
+              <a:shade val="50000"/>
+            </a:schemeClr>
+          </a:lnRef>
+          <a:fillRef idx="1">
+            <a:schemeClr val="accent1"/>
+          </a:fillRef>
+          <a:effectRef idx="0">
+            <a:schemeClr val="accent1"/>
+          </a:effectRef>
+          <a:fontRef idx="minor">
+            <a:schemeClr val="lt1"/>
+          </a:fontRef>
+        </p:style>
+        <p:txBody>
+          <a:bodyPr rtlCol="0" anchor="ctr"/>
+          <a:lstStyle/>
+          <a:p>
+            <a:pPr algn="ctr"/>
+            <a:endParaRPr lang="en-US"/>
+          </a:p>
+        </p:txBody>
+      </p:sp>
+      <p:pic>
+        <p:nvPicPr>
+          <p:cNvPr id="6" name="Picture 5">
+            <a:extLst>
+              <a:ext uri="{FF2B5EF4-FFF2-40B4-BE49-F238E27FC236}">
+                <a16:creationId xmlns:a16="http://schemas.microsoft.com/office/drawing/2014/main" id="{A51C0577-CE13-E33D-4F7E-6F3BF36232C8}"/>
+              </a:ext>
+            </a:extLst>
+          </p:cNvPr>
+          <p:cNvPicPr>
+            <a:picLocks noChangeAspect="1"/>
+          </p:cNvPicPr>
+          <p:nvPr/>
+        </p:nvPicPr>
+        <p:blipFill>
+          <a:blip r:embed="rId3"/>
+          <a:stretch>
+            <a:fillRect/>
+          </a:stretch>
+        </p:blipFill>
+        <p:spPr>
+          <a:xfrm>
+            <a:off x="2730745" y="1124712"/>
+            <a:ext cx="6730510" cy="4608576"/>
+          </a:xfrm>
+          <a:prstGeom prst="rect">
+            <a:avLst/>
+          </a:prstGeom>
+        </p:spPr>
+      </p:pic>
     </p:spTree>
     <p:extLst>
       <p:ext uri="{BB962C8B-B14F-4D97-AF65-F5344CB8AC3E}">
-        <p14:creationId xmlns:p14="http://schemas.microsoft.com/office/powerpoint/2010/main" val="4050784399"/>
+        <p14:creationId xmlns:p14="http://schemas.microsoft.com/office/powerpoint/2010/main" val="3341429516"/>
       </p:ext>
     </p:extLst>
   </p:cSld>
@@ -4288,6 +5351,16 @@
 <file path=ppt/slides/slide7.xml><?xml version="1.0" encoding="utf-8"?>
 <p:sld xmlns:a="http://schemas.openxmlformats.org/drawingml/2006/main" xmlns:r="http://schemas.openxmlformats.org/officeDocument/2006/relationships" xmlns:p="http://schemas.openxmlformats.org/presentationml/2006/main">
   <p:cSld>
+    <p:bg>
+      <p:bgPr>
+        <a:solidFill>
+          <a:schemeClr val="bg1">
+            <a:lumMod val="95000"/>
+          </a:schemeClr>
+        </a:solidFill>
+        <a:effectLst/>
+      </p:bgPr>
+    </p:bg>
     <p:spTree>
       <p:nvGrpSpPr>
         <p:cNvPr id="1" name=""/>
@@ -4304,58 +5377,385 @@
       </p:grpSpPr>
       <p:sp>
         <p:nvSpPr>
-          <p:cNvPr id="2" name="Title 1">
+          <p:cNvPr id="14" name="Rectangle 13">
             <a:extLst>
               <a:ext uri="{FF2B5EF4-FFF2-40B4-BE49-F238E27FC236}">
-                <a16:creationId xmlns:a16="http://schemas.microsoft.com/office/drawing/2014/main" id="{0F745D98-4AC6-A4FA-8BD1-3D1AAA0EA725}"/>
+                <a16:creationId xmlns:a16="http://schemas.microsoft.com/office/drawing/2014/main" id="{65041AB2-A9B4-4D3F-B120-38E7860A8F1A}"/>
+              </a:ext>
+              <a:ext uri="{C183D7F6-B498-43B3-948B-1728B52AA6E4}">
+                <adec:decorative xmlns:adec="http://schemas.microsoft.com/office/drawing/2017/decorative" val="1"/>
               </a:ext>
             </a:extLst>
           </p:cNvPr>
           <p:cNvSpPr>
-            <a:spLocks noGrp="1"/>
-          </p:cNvSpPr>
-          <p:nvPr>
-            <p:ph type="title"/>
-          </p:nvPr>
-        </p:nvSpPr>
-        <p:spPr/>
-        <p:txBody>
-          <a:bodyPr/>
-          <a:lstStyle/>
-          <a:p>
+            <a:spLocks noGrp="1" noRot="1" noChangeAspect="1" noMove="1" noResize="1" noEditPoints="1" noAdjustHandles="1" noChangeArrowheads="1" noChangeShapeType="1" noTextEdit="1"/>
+          </p:cNvSpPr>
+          <p:nvPr>
+            <p:extLst>
+              <p:ext uri="{386F3935-93C4-4BCD-93E2-E3B085C9AB24}">
+                <p16:designElem xmlns:p16="http://schemas.microsoft.com/office/powerpoint/2015/main" val="1"/>
+              </p:ext>
+            </p:extLst>
+          </p:nvPr>
+        </p:nvSpPr>
+        <p:spPr>
+          <a:xfrm>
+            <a:off x="804334" y="804334"/>
+            <a:ext cx="10583332" cy="5249332"/>
+          </a:xfrm>
+          <a:prstGeom prst="rect">
+            <a:avLst/>
+          </a:prstGeom>
+          <a:solidFill>
+            <a:srgbClr val="FFFFFF"/>
+          </a:solidFill>
+          <a:ln w="19050" cap="sq">
+            <a:solidFill>
+              <a:schemeClr val="tx1">
+                <a:lumMod val="75000"/>
+                <a:lumOff val="25000"/>
+              </a:schemeClr>
+            </a:solidFill>
+            <a:miter lim="800000"/>
+          </a:ln>
+        </p:spPr>
+        <p:style>
+          <a:lnRef idx="2">
+            <a:schemeClr val="accent1">
+              <a:shade val="50000"/>
+            </a:schemeClr>
+          </a:lnRef>
+          <a:fillRef idx="1">
+            <a:schemeClr val="accent1"/>
+          </a:fillRef>
+          <a:effectRef idx="0">
+            <a:schemeClr val="accent1"/>
+          </a:effectRef>
+          <a:fontRef idx="minor">
+            <a:schemeClr val="lt1"/>
+          </a:fontRef>
+        </p:style>
+        <p:txBody>
+          <a:bodyPr rtlCol="0" anchor="ctr"/>
+          <a:lstStyle/>
+          <a:p>
+            <a:pPr algn="ctr"/>
             <a:endParaRPr lang="en-US"/>
           </a:p>
         </p:txBody>
       </p:sp>
-      <p:sp>
-        <p:nvSpPr>
-          <p:cNvPr id="3" name="Content Placeholder 2">
+      <p:pic>
+        <p:nvPicPr>
+          <p:cNvPr id="6" name="Picture 5" descr="Chart, line chart&#10;&#10;Description automatically generated">
             <a:extLst>
               <a:ext uri="{FF2B5EF4-FFF2-40B4-BE49-F238E27FC236}">
-                <a16:creationId xmlns:a16="http://schemas.microsoft.com/office/drawing/2014/main" id="{4C1CBA00-3EBD-8B01-114A-BAD7FE31D658}"/>
+                <a16:creationId xmlns:a16="http://schemas.microsoft.com/office/drawing/2014/main" id="{D154FA1E-5BB7-B60C-E6A9-1A903DF7BACE}"/>
               </a:ext>
             </a:extLst>
           </p:cNvPr>
-          <p:cNvSpPr>
-            <a:spLocks noGrp="1"/>
-          </p:cNvSpPr>
-          <p:nvPr>
-            <p:ph idx="1"/>
-          </p:nvPr>
-        </p:nvSpPr>
-        <p:spPr/>
-        <p:txBody>
-          <a:bodyPr/>
-          <a:lstStyle/>
-          <a:p>
-            <a:endParaRPr lang="en-US"/>
-          </a:p>
-        </p:txBody>
-      </p:sp>
+          <p:cNvPicPr>
+            <a:picLocks noChangeAspect="1"/>
+          </p:cNvPicPr>
+          <p:nvPr/>
+        </p:nvPicPr>
+        <p:blipFill>
+          <a:blip r:embed="rId3"/>
+          <a:stretch>
+            <a:fillRect/>
+          </a:stretch>
+        </p:blipFill>
+        <p:spPr>
+          <a:xfrm>
+            <a:off x="2730745" y="1124712"/>
+            <a:ext cx="6730510" cy="4608576"/>
+          </a:xfrm>
+          <a:prstGeom prst="rect">
+            <a:avLst/>
+          </a:prstGeom>
+        </p:spPr>
+      </p:pic>
     </p:spTree>
     <p:extLst>
       <p:ext uri="{BB962C8B-B14F-4D97-AF65-F5344CB8AC3E}">
-        <p14:creationId xmlns:p14="http://schemas.microsoft.com/office/powerpoint/2010/main" val="3341429516"/>
+        <p14:creationId xmlns:p14="http://schemas.microsoft.com/office/powerpoint/2010/main" val="3819728465"/>
+      </p:ext>
+    </p:extLst>
+  </p:cSld>
+  <p:clrMapOvr>
+    <a:masterClrMapping/>
+  </p:clrMapOvr>
+</p:sld>
+</file>
+
+<file path=ppt/slides/slide8.xml><?xml version="1.0" encoding="utf-8"?>
+<p:sld xmlns:a="http://schemas.openxmlformats.org/drawingml/2006/main" xmlns:r="http://schemas.openxmlformats.org/officeDocument/2006/relationships" xmlns:p="http://schemas.openxmlformats.org/presentationml/2006/main">
+  <p:cSld>
+    <p:bg>
+      <p:bgPr>
+        <a:solidFill>
+          <a:schemeClr val="bg1">
+            <a:lumMod val="95000"/>
+          </a:schemeClr>
+        </a:solidFill>
+        <a:effectLst/>
+      </p:bgPr>
+    </p:bg>
+    <p:spTree>
+      <p:nvGrpSpPr>
+        <p:cNvPr id="1" name=""/>
+        <p:cNvGrpSpPr/>
+        <p:nvPr/>
+      </p:nvGrpSpPr>
+      <p:grpSpPr>
+        <a:xfrm>
+          <a:off x="0" y="0"/>
+          <a:ext cx="0" cy="0"/>
+          <a:chOff x="0" y="0"/>
+          <a:chExt cx="0" cy="0"/>
+        </a:xfrm>
+      </p:grpSpPr>
+      <p:sp>
+        <p:nvSpPr>
+          <p:cNvPr id="9" name="Rectangle 8">
+            <a:extLst>
+              <a:ext uri="{FF2B5EF4-FFF2-40B4-BE49-F238E27FC236}">
+                <a16:creationId xmlns:a16="http://schemas.microsoft.com/office/drawing/2014/main" id="{65041AB2-A9B4-4D3F-B120-38E7860A8F1A}"/>
+              </a:ext>
+              <a:ext uri="{C183D7F6-B498-43B3-948B-1728B52AA6E4}">
+                <adec:decorative xmlns:adec="http://schemas.microsoft.com/office/drawing/2017/decorative" val="1"/>
+              </a:ext>
+            </a:extLst>
+          </p:cNvPr>
+          <p:cNvSpPr>
+            <a:spLocks noGrp="1" noRot="1" noChangeAspect="1" noMove="1" noResize="1" noEditPoints="1" noAdjustHandles="1" noChangeArrowheads="1" noChangeShapeType="1" noTextEdit="1"/>
+          </p:cNvSpPr>
+          <p:nvPr>
+            <p:extLst>
+              <p:ext uri="{386F3935-93C4-4BCD-93E2-E3B085C9AB24}">
+                <p16:designElem xmlns:p16="http://schemas.microsoft.com/office/powerpoint/2015/main" val="1"/>
+              </p:ext>
+            </p:extLst>
+          </p:nvPr>
+        </p:nvSpPr>
+        <p:spPr>
+          <a:xfrm>
+            <a:off x="804334" y="804334"/>
+            <a:ext cx="10583332" cy="5249332"/>
+          </a:xfrm>
+          <a:prstGeom prst="rect">
+            <a:avLst/>
+          </a:prstGeom>
+          <a:solidFill>
+            <a:srgbClr val="FFFFFF"/>
+          </a:solidFill>
+          <a:ln w="19050" cap="sq">
+            <a:solidFill>
+              <a:schemeClr val="tx1">
+                <a:lumMod val="75000"/>
+                <a:lumOff val="25000"/>
+              </a:schemeClr>
+            </a:solidFill>
+            <a:miter lim="800000"/>
+          </a:ln>
+        </p:spPr>
+        <p:style>
+          <a:lnRef idx="2">
+            <a:schemeClr val="accent1">
+              <a:shade val="50000"/>
+            </a:schemeClr>
+          </a:lnRef>
+          <a:fillRef idx="1">
+            <a:schemeClr val="accent1"/>
+          </a:fillRef>
+          <a:effectRef idx="0">
+            <a:schemeClr val="accent1"/>
+          </a:effectRef>
+          <a:fontRef idx="minor">
+            <a:schemeClr val="lt1"/>
+          </a:fontRef>
+        </p:style>
+        <p:txBody>
+          <a:bodyPr rtlCol="0" anchor="ctr"/>
+          <a:lstStyle/>
+          <a:p>
+            <a:pPr algn="ctr"/>
+            <a:endParaRPr lang="en-US"/>
+          </a:p>
+        </p:txBody>
+      </p:sp>
+      <p:pic>
+        <p:nvPicPr>
+          <p:cNvPr id="4" name="Picture 3" descr="Chart&#10;&#10;Description automatically generated">
+            <a:extLst>
+              <a:ext uri="{FF2B5EF4-FFF2-40B4-BE49-F238E27FC236}">
+                <a16:creationId xmlns:a16="http://schemas.microsoft.com/office/drawing/2014/main" id="{05D34B18-2731-4AC8-767E-54661399B563}"/>
+              </a:ext>
+            </a:extLst>
+          </p:cNvPr>
+          <p:cNvPicPr>
+            <a:picLocks noChangeAspect="1"/>
+          </p:cNvPicPr>
+          <p:nvPr/>
+        </p:nvPicPr>
+        <p:blipFill>
+          <a:blip r:embed="rId3"/>
+          <a:stretch>
+            <a:fillRect/>
+          </a:stretch>
+        </p:blipFill>
+        <p:spPr>
+          <a:xfrm>
+            <a:off x="2730745" y="1124712"/>
+            <a:ext cx="6730510" cy="4608576"/>
+          </a:xfrm>
+          <a:prstGeom prst="rect">
+            <a:avLst/>
+          </a:prstGeom>
+        </p:spPr>
+      </p:pic>
+    </p:spTree>
+    <p:extLst>
+      <p:ext uri="{BB962C8B-B14F-4D97-AF65-F5344CB8AC3E}">
+        <p14:creationId xmlns:p14="http://schemas.microsoft.com/office/powerpoint/2010/main" val="2236298423"/>
+      </p:ext>
+    </p:extLst>
+  </p:cSld>
+  <p:clrMapOvr>
+    <a:masterClrMapping/>
+  </p:clrMapOvr>
+</p:sld>
+</file>
+
+<file path=ppt/slides/slide9.xml><?xml version="1.0" encoding="utf-8"?>
+<p:sld xmlns:a="http://schemas.openxmlformats.org/drawingml/2006/main" xmlns:r="http://schemas.openxmlformats.org/officeDocument/2006/relationships" xmlns:p="http://schemas.openxmlformats.org/presentationml/2006/main">
+  <p:cSld>
+    <p:bg>
+      <p:bgPr>
+        <a:solidFill>
+          <a:schemeClr val="bg1">
+            <a:lumMod val="95000"/>
+          </a:schemeClr>
+        </a:solidFill>
+        <a:effectLst/>
+      </p:bgPr>
+    </p:bg>
+    <p:spTree>
+      <p:nvGrpSpPr>
+        <p:cNvPr id="1" name=""/>
+        <p:cNvGrpSpPr/>
+        <p:nvPr/>
+      </p:nvGrpSpPr>
+      <p:grpSpPr>
+        <a:xfrm>
+          <a:off x="0" y="0"/>
+          <a:ext cx="0" cy="0"/>
+          <a:chOff x="0" y="0"/>
+          <a:chExt cx="0" cy="0"/>
+        </a:xfrm>
+      </p:grpSpPr>
+      <p:sp>
+        <p:nvSpPr>
+          <p:cNvPr id="19" name="Rectangle 18">
+            <a:extLst>
+              <a:ext uri="{FF2B5EF4-FFF2-40B4-BE49-F238E27FC236}">
+                <a16:creationId xmlns:a16="http://schemas.microsoft.com/office/drawing/2014/main" id="{65041AB2-A9B4-4D3F-B120-38E7860A8F1A}"/>
+              </a:ext>
+              <a:ext uri="{C183D7F6-B498-43B3-948B-1728B52AA6E4}">
+                <adec:decorative xmlns:adec="http://schemas.microsoft.com/office/drawing/2017/decorative" val="1"/>
+              </a:ext>
+            </a:extLst>
+          </p:cNvPr>
+          <p:cNvSpPr>
+            <a:spLocks noGrp="1" noRot="1" noChangeAspect="1" noMove="1" noResize="1" noEditPoints="1" noAdjustHandles="1" noChangeArrowheads="1" noChangeShapeType="1" noTextEdit="1"/>
+          </p:cNvSpPr>
+          <p:nvPr>
+            <p:extLst>
+              <p:ext uri="{386F3935-93C4-4BCD-93E2-E3B085C9AB24}">
+                <p16:designElem xmlns:p16="http://schemas.microsoft.com/office/powerpoint/2015/main" val="1"/>
+              </p:ext>
+            </p:extLst>
+          </p:nvPr>
+        </p:nvSpPr>
+        <p:spPr>
+          <a:xfrm>
+            <a:off x="804334" y="804334"/>
+            <a:ext cx="10583332" cy="5249332"/>
+          </a:xfrm>
+          <a:prstGeom prst="rect">
+            <a:avLst/>
+          </a:prstGeom>
+          <a:solidFill>
+            <a:srgbClr val="FFFFFF"/>
+          </a:solidFill>
+          <a:ln w="19050" cap="sq">
+            <a:solidFill>
+              <a:schemeClr val="tx1">
+                <a:lumMod val="75000"/>
+                <a:lumOff val="25000"/>
+              </a:schemeClr>
+            </a:solidFill>
+            <a:miter lim="800000"/>
+          </a:ln>
+        </p:spPr>
+        <p:style>
+          <a:lnRef idx="2">
+            <a:schemeClr val="accent1">
+              <a:shade val="50000"/>
+            </a:schemeClr>
+          </a:lnRef>
+          <a:fillRef idx="1">
+            <a:schemeClr val="accent1"/>
+          </a:fillRef>
+          <a:effectRef idx="0">
+            <a:schemeClr val="accent1"/>
+          </a:effectRef>
+          <a:fontRef idx="minor">
+            <a:schemeClr val="lt1"/>
+          </a:fontRef>
+        </p:style>
+        <p:txBody>
+          <a:bodyPr rtlCol="0" anchor="ctr"/>
+          <a:lstStyle/>
+          <a:p>
+            <a:pPr algn="ctr"/>
+            <a:endParaRPr lang="en-US"/>
+          </a:p>
+        </p:txBody>
+      </p:sp>
+      <p:pic>
+        <p:nvPicPr>
+          <p:cNvPr id="6" name="Picture 5" descr="Chart, line chart&#10;&#10;Description automatically generated">
+            <a:extLst>
+              <a:ext uri="{FF2B5EF4-FFF2-40B4-BE49-F238E27FC236}">
+                <a16:creationId xmlns:a16="http://schemas.microsoft.com/office/drawing/2014/main" id="{22E32002-4363-EB8B-EC3E-F839D0C3CFF4}"/>
+              </a:ext>
+            </a:extLst>
+          </p:cNvPr>
+          <p:cNvPicPr>
+            <a:picLocks noChangeAspect="1"/>
+          </p:cNvPicPr>
+          <p:nvPr/>
+        </p:nvPicPr>
+        <p:blipFill>
+          <a:blip r:embed="rId3"/>
+          <a:stretch>
+            <a:fillRect/>
+          </a:stretch>
+        </p:blipFill>
+        <p:spPr>
+          <a:xfrm>
+            <a:off x="2287402" y="1124712"/>
+            <a:ext cx="7617195" cy="4608576"/>
+          </a:xfrm>
+          <a:prstGeom prst="rect">
+            <a:avLst/>
+          </a:prstGeom>
+        </p:spPr>
+      </p:pic>
+    </p:spTree>
+    <p:extLst>
+      <p:ext uri="{BB962C8B-B14F-4D97-AF65-F5344CB8AC3E}">
+        <p14:creationId xmlns:p14="http://schemas.microsoft.com/office/powerpoint/2010/main" val="1503687175"/>
       </p:ext>
     </p:extLst>
   </p:cSld>

</xml_diff>